<commit_message>
ContactUs - Header - Footer
</commit_message>
<xml_diff>
--- a/Maquete do Projeto.pptx
+++ b/Maquete do Projeto.pptx
@@ -108,6 +108,11 @@
       </a:defRPr>
     </a:lvl9pPr>
   </p:defaultTextStyle>
+  <p:extLst>
+    <p:ext uri="{EFAFB233-063F-42B5-8137-9DF3F51BA10A}">
+      <p15:sldGuideLst xmlns:p15="http://schemas.microsoft.com/office/powerpoint/2012/main"/>
+    </p:ext>
+  </p:extLst>
 </p:presentation>
 </file>
 
@@ -260,7 +265,7 @@
           <a:p>
             <a:fld id="{EFC626F5-A0B4-40E1-9ED8-710C6306AB81}" type="datetimeFigureOut">
               <a:rPr lang="pt-BR" smtClean="0"/>
-              <a:t>04/12/2023</a:t>
+              <a:t>14/12/2023</a:t>
             </a:fld>
             <a:endParaRPr lang="pt-BR"/>
           </a:p>
@@ -460,7 +465,7 @@
           <a:p>
             <a:fld id="{EFC626F5-A0B4-40E1-9ED8-710C6306AB81}" type="datetimeFigureOut">
               <a:rPr lang="pt-BR" smtClean="0"/>
-              <a:t>04/12/2023</a:t>
+              <a:t>14/12/2023</a:t>
             </a:fld>
             <a:endParaRPr lang="pt-BR"/>
           </a:p>
@@ -670,7 +675,7 @@
           <a:p>
             <a:fld id="{EFC626F5-A0B4-40E1-9ED8-710C6306AB81}" type="datetimeFigureOut">
               <a:rPr lang="pt-BR" smtClean="0"/>
-              <a:t>04/12/2023</a:t>
+              <a:t>14/12/2023</a:t>
             </a:fld>
             <a:endParaRPr lang="pt-BR"/>
           </a:p>
@@ -870,7 +875,7 @@
           <a:p>
             <a:fld id="{EFC626F5-A0B4-40E1-9ED8-710C6306AB81}" type="datetimeFigureOut">
               <a:rPr lang="pt-BR" smtClean="0"/>
-              <a:t>04/12/2023</a:t>
+              <a:t>14/12/2023</a:t>
             </a:fld>
             <a:endParaRPr lang="pt-BR"/>
           </a:p>
@@ -1146,7 +1151,7 @@
           <a:p>
             <a:fld id="{EFC626F5-A0B4-40E1-9ED8-710C6306AB81}" type="datetimeFigureOut">
               <a:rPr lang="pt-BR" smtClean="0"/>
-              <a:t>04/12/2023</a:t>
+              <a:t>14/12/2023</a:t>
             </a:fld>
             <a:endParaRPr lang="pt-BR"/>
           </a:p>
@@ -1414,7 +1419,7 @@
           <a:p>
             <a:fld id="{EFC626F5-A0B4-40E1-9ED8-710C6306AB81}" type="datetimeFigureOut">
               <a:rPr lang="pt-BR" smtClean="0"/>
-              <a:t>04/12/2023</a:t>
+              <a:t>14/12/2023</a:t>
             </a:fld>
             <a:endParaRPr lang="pt-BR"/>
           </a:p>
@@ -1829,7 +1834,7 @@
           <a:p>
             <a:fld id="{EFC626F5-A0B4-40E1-9ED8-710C6306AB81}" type="datetimeFigureOut">
               <a:rPr lang="pt-BR" smtClean="0"/>
-              <a:t>04/12/2023</a:t>
+              <a:t>14/12/2023</a:t>
             </a:fld>
             <a:endParaRPr lang="pt-BR"/>
           </a:p>
@@ -1971,7 +1976,7 @@
           <a:p>
             <a:fld id="{EFC626F5-A0B4-40E1-9ED8-710C6306AB81}" type="datetimeFigureOut">
               <a:rPr lang="pt-BR" smtClean="0"/>
-              <a:t>04/12/2023</a:t>
+              <a:t>14/12/2023</a:t>
             </a:fld>
             <a:endParaRPr lang="pt-BR"/>
           </a:p>
@@ -2084,7 +2089,7 @@
           <a:p>
             <a:fld id="{EFC626F5-A0B4-40E1-9ED8-710C6306AB81}" type="datetimeFigureOut">
               <a:rPr lang="pt-BR" smtClean="0"/>
-              <a:t>04/12/2023</a:t>
+              <a:t>14/12/2023</a:t>
             </a:fld>
             <a:endParaRPr lang="pt-BR"/>
           </a:p>
@@ -2397,7 +2402,7 @@
           <a:p>
             <a:fld id="{EFC626F5-A0B4-40E1-9ED8-710C6306AB81}" type="datetimeFigureOut">
               <a:rPr lang="pt-BR" smtClean="0"/>
-              <a:t>04/12/2023</a:t>
+              <a:t>14/12/2023</a:t>
             </a:fld>
             <a:endParaRPr lang="pt-BR"/>
           </a:p>
@@ -2686,7 +2691,7 @@
           <a:p>
             <a:fld id="{EFC626F5-A0B4-40E1-9ED8-710C6306AB81}" type="datetimeFigureOut">
               <a:rPr lang="pt-BR" smtClean="0"/>
-              <a:t>04/12/2023</a:t>
+              <a:t>14/12/2023</a:t>
             </a:fld>
             <a:endParaRPr lang="pt-BR"/>
           </a:p>
@@ -2929,7 +2934,7 @@
           <a:p>
             <a:fld id="{EFC626F5-A0B4-40E1-9ED8-710C6306AB81}" type="datetimeFigureOut">
               <a:rPr lang="pt-BR" smtClean="0"/>
-              <a:t>04/12/2023</a:t>
+              <a:t>14/12/2023</a:t>
             </a:fld>
             <a:endParaRPr lang="pt-BR"/>
           </a:p>
@@ -3424,7 +3429,7 @@
                   <a:schemeClr val="bg1"/>
                 </a:solidFill>
               </a:rPr>
-              <a:t>Distribuiteur d Vin</a:t>
+              <a:t>Magasin de Vin</a:t>
             </a:r>
           </a:p>
         </p:txBody>
@@ -3444,7 +3449,7 @@
         <p:spPr>
           <a:xfrm>
             <a:off x="5883967" y="580527"/>
-            <a:ext cx="3445565" cy="369332"/>
+            <a:ext cx="3614115" cy="369332"/>
           </a:xfrm>
           <a:prstGeom prst="rect">
             <a:avLst/>
@@ -3463,7 +3468,7 @@
                   <a:schemeClr val="bg1"/>
                 </a:solidFill>
               </a:rPr>
-              <a:t>Accueil      Magazain   Contact Us   </a:t>
+              <a:t>Accueil      Magasin   Contactez-nous   </a:t>
             </a:r>
           </a:p>
         </p:txBody>
@@ -3512,8 +3517,8 @@
         </p:nvSpPr>
         <p:spPr>
           <a:xfrm>
-            <a:off x="7699513" y="6277473"/>
-            <a:ext cx="3445565" cy="369332"/>
+            <a:off x="7394713" y="6277473"/>
+            <a:ext cx="3750365" cy="369332"/>
           </a:xfrm>
           <a:prstGeom prst="rect">
             <a:avLst/>
@@ -3532,7 +3537,7 @@
                   <a:schemeClr val="bg1"/>
                 </a:solidFill>
               </a:rPr>
-              <a:t>Accueil      Magazain   Contact Us   </a:t>
+              <a:t>Accueil      Magasin   Contactez-nous</a:t>
             </a:r>
           </a:p>
         </p:txBody>
@@ -3573,7 +3578,7 @@
                 <a:effectLst/>
                 <a:latin typeface="Times New Roman" panose="02020603050405020304" pitchFamily="18" charset="0"/>
               </a:rPr>
-              <a:t>© magasin de Vin</a:t>
+              <a:t>© Magasin de Vin</a:t>
             </a:r>
             <a:endParaRPr lang="pt-BR" dirty="0">
               <a:solidFill>
@@ -3730,7 +3735,7 @@
           <a:p>
             <a:r>
               <a:rPr lang="pt-BR" sz="2800" dirty="0"/>
-              <a:t>Distribuiteur d Vin</a:t>
+              <a:t>Magasin de Vin</a:t>
             </a:r>
           </a:p>
         </p:txBody>
@@ -3750,7 +3755,7 @@
         <p:spPr>
           <a:xfrm>
             <a:off x="5883967" y="580527"/>
-            <a:ext cx="3445565" cy="369332"/>
+            <a:ext cx="3591337" cy="369332"/>
           </a:xfrm>
           <a:prstGeom prst="rect">
             <a:avLst/>
@@ -3765,7 +3770,7 @@
           <a:p>
             <a:r>
               <a:rPr lang="pt-BR" dirty="0"/>
-              <a:t>Accueil      Magazain   Contact Us   </a:t>
+              <a:t>Accueil      Magasin   Contactez-nous </a:t>
             </a:r>
           </a:p>
         </p:txBody>
@@ -3814,8 +3819,8 @@
         </p:nvSpPr>
         <p:spPr>
           <a:xfrm>
-            <a:off x="7699513" y="6277473"/>
-            <a:ext cx="3445565" cy="369332"/>
+            <a:off x="7474227" y="6277473"/>
+            <a:ext cx="3670852" cy="369332"/>
           </a:xfrm>
           <a:prstGeom prst="rect">
             <a:avLst/>
@@ -3830,7 +3835,7 @@
           <a:p>
             <a:r>
               <a:rPr lang="pt-BR" dirty="0"/>
-              <a:t>Accueil      Magazain   Contact Us   </a:t>
+              <a:t>Accueil      Magasin   Contactez-nous</a:t>
             </a:r>
           </a:p>
         </p:txBody>
@@ -3868,7 +3873,7 @@
                 <a:effectLst/>
                 <a:latin typeface="Times New Roman" panose="02020603050405020304" pitchFamily="18" charset="0"/>
               </a:rPr>
-              <a:t>© magasin de Vin</a:t>
+              <a:t>© Magasin de Vin</a:t>
             </a:r>
             <a:endParaRPr lang="pt-BR" dirty="0"/>
           </a:p>
@@ -4044,7 +4049,7 @@
           <a:p>
             <a:r>
               <a:rPr lang="pt-BR" sz="2800" dirty="0"/>
-              <a:t>Distribuiteur d Vin</a:t>
+              <a:t>Magasin de Vin</a:t>
             </a:r>
           </a:p>
         </p:txBody>
@@ -4064,7 +4069,7 @@
         <p:spPr>
           <a:xfrm>
             <a:off x="5883967" y="580527"/>
-            <a:ext cx="3445565" cy="369332"/>
+            <a:ext cx="3723830" cy="369332"/>
           </a:xfrm>
           <a:prstGeom prst="rect">
             <a:avLst/>
@@ -4079,7 +4084,7 @@
           <a:p>
             <a:r>
               <a:rPr lang="pt-BR" dirty="0"/>
-              <a:t>Accueil      Magazain   Contact Us   </a:t>
+              <a:t>Accueil      Magasin   Contactez-nous </a:t>
             </a:r>
           </a:p>
         </p:txBody>
@@ -4128,8 +4133,8 @@
         </p:nvSpPr>
         <p:spPr>
           <a:xfrm>
-            <a:off x="7699513" y="6277473"/>
-            <a:ext cx="3445565" cy="369332"/>
+            <a:off x="7421249" y="6277473"/>
+            <a:ext cx="3723830" cy="369332"/>
           </a:xfrm>
           <a:prstGeom prst="rect">
             <a:avLst/>
@@ -4144,7 +4149,7 @@
           <a:p>
             <a:r>
               <a:rPr lang="pt-BR" dirty="0"/>
-              <a:t>Accueil      Magazain   Contact Us   </a:t>
+              <a:t>Accueil      Magasin   Contactez-nous</a:t>
             </a:r>
           </a:p>
         </p:txBody>
@@ -4182,7 +4187,7 @@
                 <a:effectLst/>
                 <a:latin typeface="Times New Roman" panose="02020603050405020304" pitchFamily="18" charset="0"/>
               </a:rPr>
-              <a:t>© magasin de Vin</a:t>
+              <a:t>© Magasin de Vin</a:t>
             </a:r>
             <a:endParaRPr lang="pt-BR" dirty="0"/>
           </a:p>
@@ -5343,7 +5348,7 @@
           <a:p>
             <a:r>
               <a:rPr lang="pt-BR" sz="2800" dirty="0"/>
-              <a:t>Distribuiteur d Vin</a:t>
+              <a:t>Magasin de Vin</a:t>
             </a:r>
           </a:p>
         </p:txBody>
@@ -5363,7 +5368,7 @@
         <p:spPr>
           <a:xfrm>
             <a:off x="5883967" y="580527"/>
-            <a:ext cx="3445565" cy="369332"/>
+            <a:ext cx="3644348" cy="369332"/>
           </a:xfrm>
           <a:prstGeom prst="rect">
             <a:avLst/>
@@ -5378,7 +5383,7 @@
           <a:p>
             <a:r>
               <a:rPr lang="pt-BR" dirty="0"/>
-              <a:t>Accueil      Magazain   Contact Us   </a:t>
+              <a:t>Accueil      Magasin   Contactez-nous </a:t>
             </a:r>
           </a:p>
         </p:txBody>
@@ -5428,7 +5433,7 @@
         <p:spPr>
           <a:xfrm>
             <a:off x="7699513" y="6277473"/>
-            <a:ext cx="3445565" cy="369332"/>
+            <a:ext cx="3644348" cy="369332"/>
           </a:xfrm>
           <a:prstGeom prst="rect">
             <a:avLst/>
@@ -5443,7 +5448,7 @@
           <a:p>
             <a:r>
               <a:rPr lang="pt-BR" dirty="0"/>
-              <a:t>Accueil      Magazain   Contact Us   </a:t>
+              <a:t>Accueil      Magasin   Contactez-nous</a:t>
             </a:r>
           </a:p>
         </p:txBody>
@@ -5481,7 +5486,7 @@
                 <a:effectLst/>
                 <a:latin typeface="Times New Roman" panose="02020603050405020304" pitchFamily="18" charset="0"/>
               </a:rPr>
-              <a:t>© magasin de Vin</a:t>
+              <a:t>© Magasin de Vin</a:t>
             </a:r>
             <a:endParaRPr lang="pt-BR" dirty="0"/>
           </a:p>
@@ -5950,7 +5955,7 @@
           <a:p>
             <a:r>
               <a:rPr lang="pt-BR" sz="2800" dirty="0"/>
-              <a:t>Distribuiteur d Vin</a:t>
+              <a:t>Magasin de Vin</a:t>
             </a:r>
           </a:p>
         </p:txBody>
@@ -5970,7 +5975,7 @@
         <p:spPr>
           <a:xfrm>
             <a:off x="5883967" y="580527"/>
-            <a:ext cx="3445565" cy="369332"/>
+            <a:ext cx="3591337" cy="369332"/>
           </a:xfrm>
           <a:prstGeom prst="rect">
             <a:avLst/>
@@ -5985,7 +5990,7 @@
           <a:p>
             <a:r>
               <a:rPr lang="pt-BR" dirty="0"/>
-              <a:t>Accueil      Magazain   Contact Us   </a:t>
+              <a:t>Accueil      Magasin   Contactez-nous </a:t>
             </a:r>
           </a:p>
         </p:txBody>
@@ -6035,7 +6040,7 @@
         <p:spPr>
           <a:xfrm>
             <a:off x="7699513" y="6277473"/>
-            <a:ext cx="3445565" cy="369332"/>
+            <a:ext cx="3591339" cy="369332"/>
           </a:xfrm>
           <a:prstGeom prst="rect">
             <a:avLst/>
@@ -6050,7 +6055,7 @@
           <a:p>
             <a:r>
               <a:rPr lang="pt-BR" dirty="0"/>
-              <a:t>Accueil      Magazain   Contact Us   </a:t>
+              <a:t>Accueil      Magasin   Contactez-nous</a:t>
             </a:r>
           </a:p>
         </p:txBody>
@@ -6088,7 +6093,7 @@
                 <a:effectLst/>
                 <a:latin typeface="Times New Roman" panose="02020603050405020304" pitchFamily="18" charset="0"/>
               </a:rPr>
-              <a:t>© magasin de Vin</a:t>
+              <a:t>© Magasin de Vin</a:t>
             </a:r>
             <a:endParaRPr lang="pt-BR" dirty="0"/>
           </a:p>

</xml_diff>